<commit_message>
ajustes numeracion nombres de archivos
</commit_message>
<xml_diff>
--- a/clases/Unidad VI - Estadística no paramétrica.pptx
+++ b/clases/Unidad VI - Estadística no paramétrica.pptx
@@ -5,26 +5,25 @@
     <p:sldMasterId id="2147483648" r:id="rId1"/>
   </p:sldMasterIdLst>
   <p:notesMasterIdLst>
-    <p:notesMasterId r:id="rId19"/>
+    <p:notesMasterId r:id="rId18"/>
   </p:notesMasterIdLst>
   <p:sldIdLst>
     <p:sldId id="292" r:id="rId2"/>
-    <p:sldId id="421" r:id="rId3"/>
-    <p:sldId id="420" r:id="rId4"/>
-    <p:sldId id="425" r:id="rId5"/>
-    <p:sldId id="259" r:id="rId6"/>
-    <p:sldId id="438" r:id="rId7"/>
-    <p:sldId id="444" r:id="rId8"/>
-    <p:sldId id="257" r:id="rId9"/>
-    <p:sldId id="279" r:id="rId10"/>
-    <p:sldId id="445" r:id="rId11"/>
-    <p:sldId id="446" r:id="rId12"/>
-    <p:sldId id="448" r:id="rId13"/>
-    <p:sldId id="449" r:id="rId14"/>
-    <p:sldId id="450" r:id="rId15"/>
-    <p:sldId id="294" r:id="rId16"/>
-    <p:sldId id="280" r:id="rId17"/>
-    <p:sldId id="452" r:id="rId18"/>
+    <p:sldId id="420" r:id="rId3"/>
+    <p:sldId id="425" r:id="rId4"/>
+    <p:sldId id="259" r:id="rId5"/>
+    <p:sldId id="438" r:id="rId6"/>
+    <p:sldId id="444" r:id="rId7"/>
+    <p:sldId id="257" r:id="rId8"/>
+    <p:sldId id="279" r:id="rId9"/>
+    <p:sldId id="445" r:id="rId10"/>
+    <p:sldId id="446" r:id="rId11"/>
+    <p:sldId id="448" r:id="rId12"/>
+    <p:sldId id="449" r:id="rId13"/>
+    <p:sldId id="450" r:id="rId14"/>
+    <p:sldId id="294" r:id="rId15"/>
+    <p:sldId id="280" r:id="rId16"/>
+    <p:sldId id="452" r:id="rId17"/>
   </p:sldIdLst>
   <p:sldSz cx="9144000" cy="6858000" type="screen4x3"/>
   <p:notesSz cx="6858000" cy="9144000"/>
@@ -129,7 +128,6 @@
         <p14:section name="Sección predeterminada" id="{9261793B-6930-404D-B039-A0500E7237D7}">
           <p14:sldIdLst>
             <p14:sldId id="292"/>
-            <p14:sldId id="421"/>
             <p14:sldId id="420"/>
             <p14:sldId id="425"/>
             <p14:sldId id="259"/>
@@ -169,14 +167,6 @@
     </p:ext>
   </p:extLst>
 </p:presentation>
-</file>
-
-<file path=ppt/revisionInfo.xml><?xml version="1.0" encoding="utf-8"?>
-<p1510:revInfo xmlns:a="http://schemas.openxmlformats.org/drawingml/2006/main" xmlns:r="http://schemas.openxmlformats.org/officeDocument/2006/relationships" xmlns:p1510="http://schemas.microsoft.com/office/powerpoint/2015/10/main">
-  <p1510:revLst>
-    <p1510:client id="{5EF36D58-7CA2-4ECB-8CB3-5CB21443814D}" v="115" dt="2021-11-18T17:45:21.434"/>
-  </p1510:revLst>
-</p1510:revInfo>
 </file>
 
 <file path=ppt/changesInfos/changesInfo1.xml><?xml version="1.0" encoding="utf-8"?>
@@ -1603,6 +1593,37 @@
       </pc:sldMasterChg>
     </pc:docChg>
   </pc:docChgLst>
+  <pc:docChgLst>
+    <pc:chgData name="edlin guerra" userId="d52177a9150211f7" providerId="LiveId" clId="{B9140B11-D8D9-45EA-A362-AB5F9E87BFF9}"/>
+    <pc:docChg chg="delSld modSld modSection">
+      <pc:chgData name="edlin guerra" userId="d52177a9150211f7" providerId="LiveId" clId="{B9140B11-D8D9-45EA-A362-AB5F9E87BFF9}" dt="2024-06-24T16:43:05.319" v="8" actId="47"/>
+      <pc:docMkLst>
+        <pc:docMk/>
+      </pc:docMkLst>
+      <pc:sldChg chg="modSp mod">
+        <pc:chgData name="edlin guerra" userId="d52177a9150211f7" providerId="LiveId" clId="{B9140B11-D8D9-45EA-A362-AB5F9E87BFF9}" dt="2024-06-24T16:42:38.845" v="7" actId="20577"/>
+        <pc:sldMkLst>
+          <pc:docMk/>
+          <pc:sldMk cId="518660928" sldId="292"/>
+        </pc:sldMkLst>
+        <pc:spChg chg="mod">
+          <ac:chgData name="edlin guerra" userId="d52177a9150211f7" providerId="LiveId" clId="{B9140B11-D8D9-45EA-A362-AB5F9E87BFF9}" dt="2024-06-24T16:42:38.845" v="7" actId="20577"/>
+          <ac:spMkLst>
+            <pc:docMk/>
+            <pc:sldMk cId="518660928" sldId="292"/>
+            <ac:spMk id="5" creationId="{F437E857-4D77-4FAA-AD0C-87AC66D53386}"/>
+          </ac:spMkLst>
+        </pc:spChg>
+      </pc:sldChg>
+      <pc:sldChg chg="del">
+        <pc:chgData name="edlin guerra" userId="d52177a9150211f7" providerId="LiveId" clId="{B9140B11-D8D9-45EA-A362-AB5F9E87BFF9}" dt="2024-06-24T16:43:05.319" v="8" actId="47"/>
+        <pc:sldMkLst>
+          <pc:docMk/>
+          <pc:sldMk cId="0" sldId="421"/>
+        </pc:sldMkLst>
+      </pc:sldChg>
+    </pc:docChg>
+  </pc:docChgLst>
 </pc:chgInfo>
 </file>
 
@@ -1688,7 +1709,7 @@
           <a:p>
             <a:fld id="{D91FADAF-D70D-4325-8548-690F69ACCBC7}" type="datetimeFigureOut">
               <a:rPr lang="es-MX" smtClean="0"/>
-              <a:t>18/11/2021</a:t>
+              <a:t>24/06/2024</a:t>
             </a:fld>
             <a:endParaRPr lang="es-MX"/>
           </a:p>
@@ -2027,7 +2048,7 @@
               <a:pPr>
                 <a:defRPr/>
               </a:pPr>
-              <a:t>7</a:t>
+              <a:t>6</a:t>
             </a:fld>
             <a:endParaRPr lang="es-MX"/>
           </a:p>
@@ -2114,7 +2135,7 @@
             <a:fld id="{6029C97E-B04E-43E9-BE51-F7645BE7B8C3}" type="slidenum">
               <a:rPr lang="es-VE" smtClean="0"/>
               <a:pPr/>
-              <a:t>16</a:t>
+              <a:t>15</a:t>
             </a:fld>
             <a:endParaRPr lang="es-VE" dirty="0"/>
           </a:p>
@@ -2356,7 +2377,7 @@
             <a:fld id="{96AE91FC-531C-4F55-8A13-578AD8D937A4}" type="datetimeFigureOut">
               <a:rPr lang="es-VE" smtClean="0"/>
               <a:pPr/>
-              <a:t>18/11/2021</a:t>
+              <a:t>24/6/2024</a:t>
             </a:fld>
             <a:endParaRPr lang="es-VE"/>
           </a:p>
@@ -2523,7 +2544,7 @@
             <a:fld id="{96AE91FC-531C-4F55-8A13-578AD8D937A4}" type="datetimeFigureOut">
               <a:rPr lang="es-VE" smtClean="0"/>
               <a:pPr/>
-              <a:t>18/11/2021</a:t>
+              <a:t>24/6/2024</a:t>
             </a:fld>
             <a:endParaRPr lang="es-VE"/>
           </a:p>
@@ -2700,7 +2721,7 @@
             <a:fld id="{96AE91FC-531C-4F55-8A13-578AD8D937A4}" type="datetimeFigureOut">
               <a:rPr lang="es-VE" smtClean="0"/>
               <a:pPr/>
-              <a:t>18/11/2021</a:t>
+              <a:t>24/6/2024</a:t>
             </a:fld>
             <a:endParaRPr lang="es-VE"/>
           </a:p>
@@ -2867,7 +2888,7 @@
             <a:fld id="{96AE91FC-531C-4F55-8A13-578AD8D937A4}" type="datetimeFigureOut">
               <a:rPr lang="es-VE" smtClean="0"/>
               <a:pPr/>
-              <a:t>18/11/2021</a:t>
+              <a:t>24/6/2024</a:t>
             </a:fld>
             <a:endParaRPr lang="es-VE"/>
           </a:p>
@@ -3110,7 +3131,7 @@
             <a:fld id="{96AE91FC-531C-4F55-8A13-578AD8D937A4}" type="datetimeFigureOut">
               <a:rPr lang="es-VE" smtClean="0"/>
               <a:pPr/>
-              <a:t>18/11/2021</a:t>
+              <a:t>24/6/2024</a:t>
             </a:fld>
             <a:endParaRPr lang="es-VE"/>
           </a:p>
@@ -3395,7 +3416,7 @@
             <a:fld id="{96AE91FC-531C-4F55-8A13-578AD8D937A4}" type="datetimeFigureOut">
               <a:rPr lang="es-VE" smtClean="0"/>
               <a:pPr/>
-              <a:t>18/11/2021</a:t>
+              <a:t>24/6/2024</a:t>
             </a:fld>
             <a:endParaRPr lang="es-VE"/>
           </a:p>
@@ -3814,7 +3835,7 @@
             <a:fld id="{96AE91FC-531C-4F55-8A13-578AD8D937A4}" type="datetimeFigureOut">
               <a:rPr lang="es-VE" smtClean="0"/>
               <a:pPr/>
-              <a:t>18/11/2021</a:t>
+              <a:t>24/6/2024</a:t>
             </a:fld>
             <a:endParaRPr lang="es-VE"/>
           </a:p>
@@ -3929,7 +3950,7 @@
             <a:fld id="{96AE91FC-531C-4F55-8A13-578AD8D937A4}" type="datetimeFigureOut">
               <a:rPr lang="es-VE" smtClean="0"/>
               <a:pPr/>
-              <a:t>18/11/2021</a:t>
+              <a:t>24/6/2024</a:t>
             </a:fld>
             <a:endParaRPr lang="es-VE"/>
           </a:p>
@@ -4021,7 +4042,7 @@
             <a:fld id="{96AE91FC-531C-4F55-8A13-578AD8D937A4}" type="datetimeFigureOut">
               <a:rPr lang="es-VE" smtClean="0"/>
               <a:pPr/>
-              <a:t>18/11/2021</a:t>
+              <a:t>24/6/2024</a:t>
             </a:fld>
             <a:endParaRPr lang="es-VE"/>
           </a:p>
@@ -4295,7 +4316,7 @@
             <a:fld id="{96AE91FC-531C-4F55-8A13-578AD8D937A4}" type="datetimeFigureOut">
               <a:rPr lang="es-VE" smtClean="0"/>
               <a:pPr/>
-              <a:t>18/11/2021</a:t>
+              <a:t>24/6/2024</a:t>
             </a:fld>
             <a:endParaRPr lang="es-VE"/>
           </a:p>
@@ -4545,7 +4566,7 @@
             <a:fld id="{96AE91FC-531C-4F55-8A13-578AD8D937A4}" type="datetimeFigureOut">
               <a:rPr lang="es-VE" smtClean="0"/>
               <a:pPr/>
-              <a:t>18/11/2021</a:t>
+              <a:t>24/6/2024</a:t>
             </a:fld>
             <a:endParaRPr lang="es-VE"/>
           </a:p>
@@ -4755,7 +4776,7 @@
             <a:fld id="{96AE91FC-531C-4F55-8A13-578AD8D937A4}" type="datetimeFigureOut">
               <a:rPr lang="es-VE" smtClean="0"/>
               <a:pPr/>
-              <a:t>18/11/2021</a:t>
+              <a:t>24/6/2024</a:t>
             </a:fld>
             <a:endParaRPr lang="es-VE"/>
           </a:p>
@@ -5212,12 +5233,9 @@
             <a:pPr algn="ctr"/>
             <a:r>
               <a:rPr lang="es-MX" b="1" dirty="0"/>
-              <a:t>LICENCIATURA EN CIENCIAS DE LA TIERRA</a:t>
+              <a:t>LICENCIATURA EN ECOLOGÍA</a:t>
             </a:r>
-            <a:r>
-              <a:rPr lang="es-MX" dirty="0"/>
-              <a:t>	</a:t>
-            </a:r>
+            <a:endParaRPr lang="es-MX" dirty="0"/>
           </a:p>
         </p:txBody>
       </p:sp>
@@ -5314,172 +5332,6 @@
 </file>
 
 <file path=ppt/slides/slide10.xml><?xml version="1.0" encoding="utf-8"?>
-<p:sld xmlns:a="http://schemas.openxmlformats.org/drawingml/2006/main" xmlns:r="http://schemas.openxmlformats.org/officeDocument/2006/relationships" xmlns:p="http://schemas.openxmlformats.org/presentationml/2006/main">
-  <p:cSld>
-    <p:spTree>
-      <p:nvGrpSpPr>
-        <p:cNvPr id="1" name=""/>
-        <p:cNvGrpSpPr/>
-        <p:nvPr/>
-      </p:nvGrpSpPr>
-      <p:grpSpPr>
-        <a:xfrm>
-          <a:off x="0" y="0"/>
-          <a:ext cx="0" cy="0"/>
-          <a:chOff x="0" y="0"/>
-          <a:chExt cx="0" cy="0"/>
-        </a:xfrm>
-      </p:grpSpPr>
-      <p:sp>
-        <p:nvSpPr>
-          <p:cNvPr id="2" name="Título 1">
-            <a:extLst>
-              <a:ext uri="{FF2B5EF4-FFF2-40B4-BE49-F238E27FC236}">
-                <a16:creationId xmlns:a16="http://schemas.microsoft.com/office/drawing/2014/main" id="{BB503149-4CA5-4CC5-9777-1588DD8C2E93}"/>
-              </a:ext>
-            </a:extLst>
-          </p:cNvPr>
-          <p:cNvSpPr>
-            <a:spLocks noGrp="1"/>
-          </p:cNvSpPr>
-          <p:nvPr>
-            <p:ph type="title"/>
-          </p:nvPr>
-        </p:nvSpPr>
-        <p:spPr/>
-        <p:txBody>
-          <a:bodyPr>
-            <a:normAutofit/>
-          </a:bodyPr>
-          <a:lstStyle/>
-          <a:p>
-            <a:r>
-              <a:rPr lang="es-MX" dirty="0"/>
-              <a:t>Métodos Alternativos</a:t>
-            </a:r>
-          </a:p>
-        </p:txBody>
-      </p:sp>
-      <p:sp>
-        <p:nvSpPr>
-          <p:cNvPr id="3" name="Marcador de contenido 2">
-            <a:extLst>
-              <a:ext uri="{FF2B5EF4-FFF2-40B4-BE49-F238E27FC236}">
-                <a16:creationId xmlns:a16="http://schemas.microsoft.com/office/drawing/2014/main" id="{A5B63740-DB11-4761-9C4D-8A3AE066C375}"/>
-              </a:ext>
-            </a:extLst>
-          </p:cNvPr>
-          <p:cNvSpPr>
-            <a:spLocks noGrp="1"/>
-          </p:cNvSpPr>
-          <p:nvPr>
-            <p:ph idx="1"/>
-          </p:nvPr>
-        </p:nvSpPr>
-        <p:spPr/>
-        <p:txBody>
-          <a:bodyPr/>
-          <a:lstStyle/>
-          <a:p>
-            <a:r>
-              <a:rPr lang="es-MX" b="1" dirty="0"/>
-              <a:t>Pruebas no paramétricos</a:t>
-            </a:r>
-            <a:r>
-              <a:rPr lang="es-MX" dirty="0"/>
-              <a:t>:</a:t>
-            </a:r>
-          </a:p>
-          <a:p>
-            <a:pPr lvl="1"/>
-            <a:r>
-              <a:rPr lang="es-MX" dirty="0"/>
-              <a:t>Prueba de Kruskal-Wallis</a:t>
-            </a:r>
-          </a:p>
-          <a:p>
-            <a:pPr lvl="1"/>
-            <a:r>
-              <a:rPr lang="es-MX" dirty="0"/>
-              <a:t>Prueba de </a:t>
-            </a:r>
-            <a:r>
-              <a:rPr lang="es-MX" b="0" i="0" u="none" strike="noStrike" baseline="0" dirty="0">
-                <a:latin typeface="Swift-Regular"/>
-              </a:rPr>
-              <a:t>Mann–Whitney</a:t>
-            </a:r>
-          </a:p>
-          <a:p>
-            <a:pPr lvl="1"/>
-            <a:r>
-              <a:rPr lang="es-MX" dirty="0">
-                <a:latin typeface="Swift-Regular"/>
-              </a:rPr>
-              <a:t>Prueba de Wilcoxon</a:t>
-            </a:r>
-          </a:p>
-          <a:p>
-            <a:pPr lvl="1"/>
-            <a:r>
-              <a:rPr lang="es-MX" dirty="0">
-                <a:latin typeface="Swift-Regular"/>
-              </a:rPr>
-              <a:t>Otras</a:t>
-            </a:r>
-            <a:endParaRPr lang="es-MX" dirty="0"/>
-          </a:p>
-        </p:txBody>
-      </p:sp>
-      <p:sp>
-        <p:nvSpPr>
-          <p:cNvPr id="4" name="CuadroTexto 3">
-            <a:extLst>
-              <a:ext uri="{FF2B5EF4-FFF2-40B4-BE49-F238E27FC236}">
-                <a16:creationId xmlns:a16="http://schemas.microsoft.com/office/drawing/2014/main" id="{A2BF61AD-5261-473B-A4C1-3A15B52F7A46}"/>
-              </a:ext>
-            </a:extLst>
-          </p:cNvPr>
-          <p:cNvSpPr txBox="1"/>
-          <p:nvPr/>
-        </p:nvSpPr>
-        <p:spPr>
-          <a:xfrm>
-            <a:off x="827584" y="4622655"/>
-            <a:ext cx="8136904" cy="646331"/>
-          </a:xfrm>
-          <a:prstGeom prst="rect">
-            <a:avLst/>
-          </a:prstGeom>
-          <a:noFill/>
-        </p:spPr>
-        <p:txBody>
-          <a:bodyPr wrap="square" rtlCol="0">
-            <a:spAutoFit/>
-          </a:bodyPr>
-          <a:lstStyle/>
-          <a:p>
-            <a:r>
-              <a:rPr lang="es-MX" dirty="0"/>
-              <a:t>En todas la aproximación es muy similar, cambia el estadístico de contraste y los supuestos asociados</a:t>
-            </a:r>
-          </a:p>
-        </p:txBody>
-      </p:sp>
-    </p:spTree>
-    <p:extLst>
-      <p:ext uri="{BB962C8B-B14F-4D97-AF65-F5344CB8AC3E}">
-        <p14:creationId xmlns:p14="http://schemas.microsoft.com/office/powerpoint/2010/main" val="4264054702"/>
-      </p:ext>
-    </p:extLst>
-  </p:cSld>
-  <p:clrMapOvr>
-    <a:masterClrMapping/>
-  </p:clrMapOvr>
-</p:sld>
-</file>
-
-<file path=ppt/slides/slide11.xml><?xml version="1.0" encoding="utf-8"?>
 <p:sld xmlns:a="http://schemas.openxmlformats.org/drawingml/2006/main" xmlns:r="http://schemas.openxmlformats.org/officeDocument/2006/relationships" xmlns:p="http://schemas.openxmlformats.org/presentationml/2006/main">
   <p:cSld>
     <p:spTree>
@@ -5621,7 +5473,7 @@
 </p:sld>
 </file>
 
-<file path=ppt/slides/slide12.xml><?xml version="1.0" encoding="utf-8"?>
+<file path=ppt/slides/slide11.xml><?xml version="1.0" encoding="utf-8"?>
 <p:sld xmlns:a="http://schemas.openxmlformats.org/drawingml/2006/main" xmlns:r="http://schemas.openxmlformats.org/officeDocument/2006/relationships" xmlns:p="http://schemas.openxmlformats.org/presentationml/2006/main">
   <p:cSld>
     <p:spTree>
@@ -8350,7 +8202,7 @@
 </p:sld>
 </file>
 
-<file path=ppt/slides/slide13.xml><?xml version="1.0" encoding="utf-8"?>
+<file path=ppt/slides/slide12.xml><?xml version="1.0" encoding="utf-8"?>
 <p:sld xmlns:a="http://schemas.openxmlformats.org/drawingml/2006/main" xmlns:r="http://schemas.openxmlformats.org/officeDocument/2006/relationships" xmlns:p="http://schemas.openxmlformats.org/presentationml/2006/main">
   <p:cSld>
     <p:spTree>
@@ -8463,7 +8315,7 @@
 </p:sld>
 </file>
 
-<file path=ppt/slides/slide14.xml><?xml version="1.0" encoding="utf-8"?>
+<file path=ppt/slides/slide13.xml><?xml version="1.0" encoding="utf-8"?>
 <p:sld xmlns:a="http://schemas.openxmlformats.org/drawingml/2006/main" xmlns:r="http://schemas.openxmlformats.org/officeDocument/2006/relationships" xmlns:p="http://schemas.openxmlformats.org/presentationml/2006/main">
   <p:cSld>
     <p:spTree>
@@ -8725,7 +8577,7 @@
 </p:sld>
 </file>
 
-<file path=ppt/slides/slide15.xml><?xml version="1.0" encoding="utf-8"?>
+<file path=ppt/slides/slide14.xml><?xml version="1.0" encoding="utf-8"?>
 <p:sld xmlns:a="http://schemas.openxmlformats.org/drawingml/2006/main" xmlns:r="http://schemas.openxmlformats.org/officeDocument/2006/relationships" xmlns:p="http://schemas.openxmlformats.org/presentationml/2006/main">
   <p:cSld>
     <p:spTree>
@@ -9324,7 +9176,7 @@
 </p:sld>
 </file>
 
-<file path=ppt/slides/slide16.xml><?xml version="1.0" encoding="utf-8"?>
+<file path=ppt/slides/slide15.xml><?xml version="1.0" encoding="utf-8"?>
 <p:sld xmlns:a="http://schemas.openxmlformats.org/drawingml/2006/main" xmlns:r="http://schemas.openxmlformats.org/officeDocument/2006/relationships" xmlns:p="http://schemas.openxmlformats.org/presentationml/2006/main">
   <p:cSld>
     <p:spTree>
@@ -13001,7 +12853,7 @@
 </p:sld>
 </file>
 
-<file path=ppt/slides/slide17.xml><?xml version="1.0" encoding="utf-8"?>
+<file path=ppt/slides/slide16.xml><?xml version="1.0" encoding="utf-8"?>
 <p:sld xmlns:a="http://schemas.openxmlformats.org/drawingml/2006/main" xmlns:r="http://schemas.openxmlformats.org/officeDocument/2006/relationships" xmlns:p="http://schemas.openxmlformats.org/presentationml/2006/main">
   <p:cSld>
     <p:spTree>
@@ -14235,159 +14087,6 @@
       </p:grpSpPr>
       <p:sp>
         <p:nvSpPr>
-          <p:cNvPr id="5" name="4 CuadroTexto"/>
-          <p:cNvSpPr txBox="1"/>
-          <p:nvPr/>
-        </p:nvSpPr>
-        <p:spPr>
-          <a:xfrm>
-            <a:off x="4067944" y="372308"/>
-            <a:ext cx="4541822" cy="3539430"/>
-          </a:xfrm>
-          <a:prstGeom prst="rect">
-            <a:avLst/>
-          </a:prstGeom>
-          <a:noFill/>
-        </p:spPr>
-        <p:txBody>
-          <a:bodyPr wrap="square" rtlCol="0">
-            <a:spAutoFit/>
-          </a:bodyPr>
-          <a:lstStyle/>
-          <a:p>
-            <a:pPr algn="ctr"/>
-            <a:r>
-              <a:rPr lang="es-VE" sz="2800" b="1" dirty="0">
-                <a:latin typeface="Arial" pitchFamily="34" charset="0"/>
-                <a:cs typeface="Arial" pitchFamily="34" charset="0"/>
-              </a:rPr>
-              <a:t>¿por qué se requiere de estadística en las ciencias de la tierra?</a:t>
-            </a:r>
-          </a:p>
-          <a:p>
-            <a:pPr algn="ctr"/>
-            <a:endParaRPr lang="es-VE" sz="2800" b="1" dirty="0">
-              <a:latin typeface="Arial" pitchFamily="34" charset="0"/>
-              <a:cs typeface="Arial" pitchFamily="34" charset="0"/>
-            </a:endParaRPr>
-          </a:p>
-          <a:p>
-            <a:pPr algn="ctr"/>
-            <a:r>
-              <a:rPr lang="es-VE" sz="2800" b="1" dirty="0">
-                <a:latin typeface="Arial" pitchFamily="34" charset="0"/>
-                <a:cs typeface="Arial" pitchFamily="34" charset="0"/>
-              </a:rPr>
-              <a:t>¿por qué tenemos que diseñar estadísticamente los estudios?</a:t>
-            </a:r>
-          </a:p>
-          <a:p>
-            <a:pPr algn="ctr"/>
-            <a:endParaRPr lang="es-VE" sz="2800" b="1" dirty="0">
-              <a:latin typeface="Arial" pitchFamily="34" charset="0"/>
-              <a:cs typeface="Arial" pitchFamily="34" charset="0"/>
-            </a:endParaRPr>
-          </a:p>
-        </p:txBody>
-      </p:sp>
-      <p:pic>
-        <p:nvPicPr>
-          <p:cNvPr id="3" name="Picture 5" descr="http://sp8.fotolog.com/photo/56/30/42/xirly_smile/1247958685626_f.jpg"/>
-          <p:cNvPicPr>
-            <a:picLocks noChangeAspect="1" noChangeArrowheads="1"/>
-          </p:cNvPicPr>
-          <p:nvPr/>
-        </p:nvPicPr>
-        <p:blipFill>
-          <a:blip r:embed="rId2"/>
-          <a:srcRect/>
-          <a:stretch>
-            <a:fillRect/>
-          </a:stretch>
-        </p:blipFill>
-        <p:spPr bwMode="auto">
-          <a:xfrm>
-            <a:off x="445635" y="620688"/>
-            <a:ext cx="3613785" cy="4680520"/>
-          </a:xfrm>
-          <a:prstGeom prst="rect">
-            <a:avLst/>
-          </a:prstGeom>
-          <a:noFill/>
-          <a:ln w="9525">
-            <a:noFill/>
-            <a:miter lim="800000"/>
-            <a:headEnd/>
-            <a:tailEnd/>
-          </a:ln>
-        </p:spPr>
-      </p:pic>
-      <p:pic>
-        <p:nvPicPr>
-          <p:cNvPr id="4" name="Imagen 3" descr="Imagen que contiene tabla, pequeño, verde, tazón&#10;&#10;Descripción generada automáticamente">
-            <a:extLst>
-              <a:ext uri="{FF2B5EF4-FFF2-40B4-BE49-F238E27FC236}">
-                <a16:creationId xmlns:a16="http://schemas.microsoft.com/office/drawing/2014/main" id="{84B9F76C-14B1-4B3F-A6EB-15114DEA143E}"/>
-              </a:ext>
-            </a:extLst>
-          </p:cNvPr>
-          <p:cNvPicPr>
-            <a:picLocks noChangeAspect="1"/>
-          </p:cNvPicPr>
-          <p:nvPr/>
-        </p:nvPicPr>
-        <p:blipFill>
-          <a:blip r:embed="rId3">
-            <a:extLst>
-              <a:ext uri="{28A0092B-C50C-407E-A947-70E740481C1C}">
-                <a14:useLocalDpi xmlns:a14="http://schemas.microsoft.com/office/drawing/2010/main" val="0"/>
-              </a:ext>
-              <a:ext uri="{837473B0-CC2E-450A-ABE3-18F120FF3D39}">
-                <a1611:picAttrSrcUrl xmlns:a1611="http://schemas.microsoft.com/office/drawing/2016/11/main" r:id="rId4"/>
-              </a:ext>
-            </a:extLst>
-          </a:blip>
-          <a:stretch>
-            <a:fillRect/>
-          </a:stretch>
-        </p:blipFill>
-        <p:spPr>
-          <a:xfrm>
-            <a:off x="5436096" y="3882038"/>
-            <a:ext cx="2324238" cy="2382344"/>
-          </a:xfrm>
-          <a:prstGeom prst="rect">
-            <a:avLst/>
-          </a:prstGeom>
-        </p:spPr>
-      </p:pic>
-    </p:spTree>
-  </p:cSld>
-  <p:clrMapOvr>
-    <a:masterClrMapping/>
-  </p:clrMapOvr>
-</p:sld>
-</file>
-
-<file path=ppt/slides/slide3.xml><?xml version="1.0" encoding="utf-8"?>
-<p:sld xmlns:a="http://schemas.openxmlformats.org/drawingml/2006/main" xmlns:r="http://schemas.openxmlformats.org/officeDocument/2006/relationships" xmlns:p="http://schemas.openxmlformats.org/presentationml/2006/main">
-  <p:cSld>
-    <p:spTree>
-      <p:nvGrpSpPr>
-        <p:cNvPr id="1" name=""/>
-        <p:cNvGrpSpPr/>
-        <p:nvPr/>
-      </p:nvGrpSpPr>
-      <p:grpSpPr>
-        <a:xfrm>
-          <a:off x="0" y="0"/>
-          <a:ext cx="0" cy="0"/>
-          <a:chOff x="0" y="0"/>
-          <a:chExt cx="0" cy="0"/>
-        </a:xfrm>
-      </p:grpSpPr>
-      <p:sp>
-        <p:nvSpPr>
           <p:cNvPr id="5123" name="Rectangle 3"/>
           <p:cNvSpPr>
             <a:spLocks noGrp="1" noChangeArrowheads="1"/>
@@ -14787,7 +14486,7 @@
 </p:sld>
 </file>
 
-<file path=ppt/slides/slide4.xml><?xml version="1.0" encoding="utf-8"?>
+<file path=ppt/slides/slide3.xml><?xml version="1.0" encoding="utf-8"?>
 <p:sld xmlns:a="http://schemas.openxmlformats.org/drawingml/2006/main" xmlns:r="http://schemas.openxmlformats.org/officeDocument/2006/relationships" xmlns:p="http://schemas.openxmlformats.org/presentationml/2006/main">
   <p:cSld>
     <p:spTree>
@@ -14824,7 +14523,7 @@
             <a:fld id="{B3C70422-D30F-41F4-883E-9DC6BC612615}" type="slidenum">
               <a:rPr lang="es-ES" smtClean="0"/>
               <a:pPr/>
-              <a:t>4</a:t>
+              <a:t>3</a:t>
             </a:fld>
             <a:endParaRPr lang="es-ES"/>
           </a:p>
@@ -15399,7 +15098,7 @@
 </p:sld>
 </file>
 
-<file path=ppt/slides/slide5.xml><?xml version="1.0" encoding="utf-8"?>
+<file path=ppt/slides/slide4.xml><?xml version="1.0" encoding="utf-8"?>
 <p:sld xmlns:a="http://schemas.openxmlformats.org/drawingml/2006/main" xmlns:r="http://schemas.openxmlformats.org/officeDocument/2006/relationships" xmlns:p="http://schemas.openxmlformats.org/presentationml/2006/main">
   <p:cSld>
     <p:spTree>
@@ -15440,7 +15139,7 @@
                 </a:solidFill>
               </a:rPr>
               <a:pPr/>
-              <a:t>5</a:t>
+              <a:t>4</a:t>
             </a:fld>
             <a:endParaRPr lang="es-ES">
               <a:solidFill>
@@ -16214,7 +15913,7 @@
 </p:sld>
 </file>
 
-<file path=ppt/slides/slide6.xml><?xml version="1.0" encoding="utf-8"?>
+<file path=ppt/slides/slide5.xml><?xml version="1.0" encoding="utf-8"?>
 <p:sld xmlns:a="http://schemas.openxmlformats.org/drawingml/2006/main" xmlns:r="http://schemas.openxmlformats.org/officeDocument/2006/relationships" xmlns:p="http://schemas.openxmlformats.org/presentationml/2006/main">
   <p:cSld>
     <p:spTree>
@@ -17042,7 +16741,7 @@
 </p:sld>
 </file>
 
-<file path=ppt/slides/slide7.xml><?xml version="1.0" encoding="utf-8"?>
+<file path=ppt/slides/slide6.xml><?xml version="1.0" encoding="utf-8"?>
 <p:sld xmlns:a="http://schemas.openxmlformats.org/drawingml/2006/main" xmlns:r="http://schemas.openxmlformats.org/officeDocument/2006/relationships" xmlns:p="http://schemas.openxmlformats.org/presentationml/2006/main">
   <p:cSld>
     <p:spTree>
@@ -17959,7 +17658,7 @@
 </p:sld>
 </file>
 
-<file path=ppt/slides/slide8.xml><?xml version="1.0" encoding="utf-8"?>
+<file path=ppt/slides/slide7.xml><?xml version="1.0" encoding="utf-8"?>
 <p:sld xmlns:a="http://schemas.openxmlformats.org/drawingml/2006/main" xmlns:r="http://schemas.openxmlformats.org/officeDocument/2006/relationships" xmlns:p="http://schemas.openxmlformats.org/presentationml/2006/main">
   <p:cSld>
     <p:spTree>
@@ -18101,7 +17800,7 @@
 </p:sld>
 </file>
 
-<file path=ppt/slides/slide9.xml><?xml version="1.0" encoding="utf-8"?>
+<file path=ppt/slides/slide8.xml><?xml version="1.0" encoding="utf-8"?>
 <p:sld xmlns:a="http://schemas.openxmlformats.org/drawingml/2006/main" xmlns:r="http://schemas.openxmlformats.org/officeDocument/2006/relationships" xmlns:p="http://schemas.openxmlformats.org/presentationml/2006/main">
   <p:cSld>
     <p:spTree>
@@ -19838,6 +19537,172 @@
         </p:txBody>
       </p:sp>
     </p:spTree>
+  </p:cSld>
+  <p:clrMapOvr>
+    <a:masterClrMapping/>
+  </p:clrMapOvr>
+</p:sld>
+</file>
+
+<file path=ppt/slides/slide9.xml><?xml version="1.0" encoding="utf-8"?>
+<p:sld xmlns:a="http://schemas.openxmlformats.org/drawingml/2006/main" xmlns:r="http://schemas.openxmlformats.org/officeDocument/2006/relationships" xmlns:p="http://schemas.openxmlformats.org/presentationml/2006/main">
+  <p:cSld>
+    <p:spTree>
+      <p:nvGrpSpPr>
+        <p:cNvPr id="1" name=""/>
+        <p:cNvGrpSpPr/>
+        <p:nvPr/>
+      </p:nvGrpSpPr>
+      <p:grpSpPr>
+        <a:xfrm>
+          <a:off x="0" y="0"/>
+          <a:ext cx="0" cy="0"/>
+          <a:chOff x="0" y="0"/>
+          <a:chExt cx="0" cy="0"/>
+        </a:xfrm>
+      </p:grpSpPr>
+      <p:sp>
+        <p:nvSpPr>
+          <p:cNvPr id="2" name="Título 1">
+            <a:extLst>
+              <a:ext uri="{FF2B5EF4-FFF2-40B4-BE49-F238E27FC236}">
+                <a16:creationId xmlns:a16="http://schemas.microsoft.com/office/drawing/2014/main" id="{BB503149-4CA5-4CC5-9777-1588DD8C2E93}"/>
+              </a:ext>
+            </a:extLst>
+          </p:cNvPr>
+          <p:cNvSpPr>
+            <a:spLocks noGrp="1"/>
+          </p:cNvSpPr>
+          <p:nvPr>
+            <p:ph type="title"/>
+          </p:nvPr>
+        </p:nvSpPr>
+        <p:spPr/>
+        <p:txBody>
+          <a:bodyPr>
+            <a:normAutofit/>
+          </a:bodyPr>
+          <a:lstStyle/>
+          <a:p>
+            <a:r>
+              <a:rPr lang="es-MX" dirty="0"/>
+              <a:t>Métodos Alternativos</a:t>
+            </a:r>
+          </a:p>
+        </p:txBody>
+      </p:sp>
+      <p:sp>
+        <p:nvSpPr>
+          <p:cNvPr id="3" name="Marcador de contenido 2">
+            <a:extLst>
+              <a:ext uri="{FF2B5EF4-FFF2-40B4-BE49-F238E27FC236}">
+                <a16:creationId xmlns:a16="http://schemas.microsoft.com/office/drawing/2014/main" id="{A5B63740-DB11-4761-9C4D-8A3AE066C375}"/>
+              </a:ext>
+            </a:extLst>
+          </p:cNvPr>
+          <p:cNvSpPr>
+            <a:spLocks noGrp="1"/>
+          </p:cNvSpPr>
+          <p:nvPr>
+            <p:ph idx="1"/>
+          </p:nvPr>
+        </p:nvSpPr>
+        <p:spPr/>
+        <p:txBody>
+          <a:bodyPr/>
+          <a:lstStyle/>
+          <a:p>
+            <a:r>
+              <a:rPr lang="es-MX" b="1" dirty="0"/>
+              <a:t>Pruebas no paramétricos</a:t>
+            </a:r>
+            <a:r>
+              <a:rPr lang="es-MX" dirty="0"/>
+              <a:t>:</a:t>
+            </a:r>
+          </a:p>
+          <a:p>
+            <a:pPr lvl="1"/>
+            <a:r>
+              <a:rPr lang="es-MX" dirty="0"/>
+              <a:t>Prueba de Kruskal-Wallis</a:t>
+            </a:r>
+          </a:p>
+          <a:p>
+            <a:pPr lvl="1"/>
+            <a:r>
+              <a:rPr lang="es-MX" dirty="0"/>
+              <a:t>Prueba de </a:t>
+            </a:r>
+            <a:r>
+              <a:rPr lang="es-MX" b="0" i="0" u="none" strike="noStrike" baseline="0" dirty="0">
+                <a:latin typeface="Swift-Regular"/>
+              </a:rPr>
+              <a:t>Mann–Whitney</a:t>
+            </a:r>
+          </a:p>
+          <a:p>
+            <a:pPr lvl="1"/>
+            <a:r>
+              <a:rPr lang="es-MX" dirty="0">
+                <a:latin typeface="Swift-Regular"/>
+              </a:rPr>
+              <a:t>Prueba de Wilcoxon</a:t>
+            </a:r>
+          </a:p>
+          <a:p>
+            <a:pPr lvl="1"/>
+            <a:r>
+              <a:rPr lang="es-MX" dirty="0">
+                <a:latin typeface="Swift-Regular"/>
+              </a:rPr>
+              <a:t>Otras</a:t>
+            </a:r>
+            <a:endParaRPr lang="es-MX" dirty="0"/>
+          </a:p>
+        </p:txBody>
+      </p:sp>
+      <p:sp>
+        <p:nvSpPr>
+          <p:cNvPr id="4" name="CuadroTexto 3">
+            <a:extLst>
+              <a:ext uri="{FF2B5EF4-FFF2-40B4-BE49-F238E27FC236}">
+                <a16:creationId xmlns:a16="http://schemas.microsoft.com/office/drawing/2014/main" id="{A2BF61AD-5261-473B-A4C1-3A15B52F7A46}"/>
+              </a:ext>
+            </a:extLst>
+          </p:cNvPr>
+          <p:cNvSpPr txBox="1"/>
+          <p:nvPr/>
+        </p:nvSpPr>
+        <p:spPr>
+          <a:xfrm>
+            <a:off x="827584" y="4622655"/>
+            <a:ext cx="8136904" cy="646331"/>
+          </a:xfrm>
+          <a:prstGeom prst="rect">
+            <a:avLst/>
+          </a:prstGeom>
+          <a:noFill/>
+        </p:spPr>
+        <p:txBody>
+          <a:bodyPr wrap="square" rtlCol="0">
+            <a:spAutoFit/>
+          </a:bodyPr>
+          <a:lstStyle/>
+          <a:p>
+            <a:r>
+              <a:rPr lang="es-MX" dirty="0"/>
+              <a:t>En todas la aproximación es muy similar, cambia el estadístico de contraste y los supuestos asociados</a:t>
+            </a:r>
+          </a:p>
+        </p:txBody>
+      </p:sp>
+    </p:spTree>
+    <p:extLst>
+      <p:ext uri="{BB962C8B-B14F-4D97-AF65-F5344CB8AC3E}">
+        <p14:creationId xmlns:p14="http://schemas.microsoft.com/office/powerpoint/2010/main" val="4264054702"/>
+      </p:ext>
+    </p:extLst>
   </p:cSld>
   <p:clrMapOvr>
     <a:masterClrMapping/>

</xml_diff>